<commit_message>
Deployed 4649ae9 with MkDocs version: 1.1.2
</commit_message>
<xml_diff>
--- a/block_1/lecture_2/slides.pptx
+++ b/block_1/lecture_2/slides.pptx
@@ -5,7 +5,7 @@
     <p:sldMasterId id="2147483648" r:id="rId1"/>
   </p:sldMasterIdLst>
   <p:notesMasterIdLst>
-    <p:NotesMasterId r:id="rId21"/>
+    <p:NotesMasterId r:id="rId20"/>
   </p:notesMasterIdLst>
   <p:sldIdLst>
     <p:sldId id="256" r:id="rId2"/>
@@ -26,7 +26,6 @@
     <p:sldId id="271" r:id="rId17"/>
     <p:sldId id="272" r:id="rId18"/>
     <p:sldId id="273" r:id="rId19"/>
-    <p:sldId id="274" r:id="rId20"/>
   </p:sldIdLst>
   <p:sldSz cx="12192000" cy="6858000"/>
   <p:notesSz cx="6858000" cy="9144000"/>
@@ -1908,7 +1907,7 @@
           <a:p>
             <a:fld id="{253E99D3-575E-4B33-AEE3-580024E0F63F}" type="slidenum">
               <a:rPr lang="en-US"/>
-              <a:t>5</a:t>
+              <a:t>4</a:t>
             </a:fld>
             <a:endParaRPr lang="en-US"/>
           </a:p>
@@ -2906,7 +2905,7 @@
           <a:p>
             <a:fld id="{253E99D3-575E-4B33-AEE3-580024E0F63F}" type="slidenum">
               <a:rPr lang="en-US"/>
-              <a:t>6</a:t>
+              <a:t>5</a:t>
             </a:fld>
             <a:endParaRPr lang="en-US"/>
           </a:p>
@@ -8213,7 +8212,15 @@
             </a:pPr>
             <a:r>
               <a:rPr/>
-              <a:t>Links</a:t>
+              <a:t>Bullet</a:t>
+            </a:r>
+            <a:r>
+              <a:rPr/>
+              <a:t> </a:t>
+            </a:r>
+            <a:r>
+              <a:rPr/>
+              <a:t>Lists</a:t>
             </a:r>
           </a:p>
         </p:txBody>
@@ -8238,7 +8245,7 @@
             </a:pPr>
             <a:r>
               <a:rPr/>
-              <a:t>There are two ways to format links:</a:t>
+              <a:t>Bullet lists can be made with asterix:</a:t>
             </a:r>
           </a:p>
           <a:p>
@@ -8249,7 +8256,9 @@
               <a:rPr sz="1800">
                 <a:latin typeface="Courier"/>
               </a:rPr>
-              <a:t>[An inline link](http://a.com)</a:t>
+              <a:t>* a
+* bullet
+* list</a:t>
             </a:r>
           </a:p>
           <a:p>
@@ -8258,7 +8267,7 @@
             </a:pPr>
             <a:r>
               <a:rPr/>
-              <a:t>or</a:t>
+              <a:t>or hyphens:</a:t>
             </a:r>
           </a:p>
           <a:p>
@@ -8269,9 +8278,9 @@
               <a:rPr sz="1800">
                 <a:latin typeface="Courier"/>
               </a:rPr>
-              <a:t>[Link][1]
-This is a good way to record references in a lesson
-[1]: http://b.org</a:t>
+              <a:t>- a
+- bullet
+- list</a:t>
             </a:r>
           </a:p>
           <a:p>
@@ -8280,17 +8289,28 @@
             </a:pPr>
             <a:r>
               <a:rPr/>
-              <a:t>Both appear </a:t>
-            </a:r>
-            <a:r>
-              <a:rPr>
-                <a:hlinkClick r:id="rId2"/>
-              </a:rPr>
-              <a:t>like this</a:t>
-            </a:r>
-            <a:r>
-              <a:rPr/>
-              <a:t>.</a:t>
+              <a:t>which render as:</a:t>
+            </a:r>
+          </a:p>
+          <a:p>
+            <a:pPr lvl="1"/>
+            <a:r>
+              <a:rPr/>
+              <a:t>a</a:t>
+            </a:r>
+          </a:p>
+          <a:p>
+            <a:pPr lvl="1"/>
+            <a:r>
+              <a:rPr/>
+              <a:t>bullet</a:t>
+            </a:r>
+          </a:p>
+          <a:p>
+            <a:pPr lvl="1"/>
+            <a:r>
+              <a:rPr/>
+              <a:t>list</a:t>
             </a:r>
           </a:p>
         </p:txBody>
@@ -8342,7 +8362,7 @@
             </a:pPr>
             <a:r>
               <a:rPr/>
-              <a:t>Bullet</a:t>
+              <a:t>Numbered</a:t>
             </a:r>
             <a:r>
               <a:rPr/>
@@ -8375,7 +8395,7 @@
             </a:pPr>
             <a:r>
               <a:rPr/>
-              <a:t>Bullet lists can be made with asterix:</a:t>
+              <a:t>A numbered list like so:</a:t>
             </a:r>
           </a:p>
           <a:p>
@@ -8386,9 +8406,9 @@
               <a:rPr sz="1800">
                 <a:latin typeface="Courier"/>
               </a:rPr>
-              <a:t>* a
-* bullet
-* list</a:t>
+              <a:t>1. a
+2. numbered
+3. list</a:t>
             </a:r>
           </a:p>
           <a:p>
@@ -8397,7 +8417,7 @@
             </a:pPr>
             <a:r>
               <a:rPr/>
-              <a:t>or hyphens:</a:t>
+              <a:t>or like so:</a:t>
             </a:r>
           </a:p>
           <a:p>
@@ -8408,39 +8428,9 @@
               <a:rPr sz="1800">
                 <a:latin typeface="Courier"/>
               </a:rPr>
-              <a:t>- a
-- bullet
-- list</a:t>
-            </a:r>
-          </a:p>
-          <a:p>
-            <a:pPr lvl="0" marL="0" indent="0">
-              <a:buNone/>
-            </a:pPr>
-            <a:r>
-              <a:rPr/>
-              <a:t>which render as:</a:t>
-            </a:r>
-          </a:p>
-          <a:p>
-            <a:pPr lvl="1"/>
-            <a:r>
-              <a:rPr/>
-              <a:t>a</a:t>
-            </a:r>
-          </a:p>
-          <a:p>
-            <a:pPr lvl="1"/>
-            <a:r>
-              <a:rPr/>
-              <a:t>bullet</a:t>
-            </a:r>
-          </a:p>
-          <a:p>
-            <a:pPr lvl="1"/>
-            <a:r>
-              <a:rPr/>
-              <a:t>list</a:t>
+              <a:t>1) a
+2) numbered
+3) list</a:t>
             </a:r>
           </a:p>
         </p:txBody>
@@ -8451,6 +8441,80 @@
 </file>
 
 <file path=ppt/slides/slide12.xml><?xml version="1.0" encoding="utf-8"?>
+<p:sld xmlns:a="http://schemas.openxmlformats.org/drawingml/2006/main" xmlns:r="http://schemas.openxmlformats.org/officeDocument/2006/relationships" xmlns:p="http://schemas.openxmlformats.org/presentationml/2006/main">
+  <p:cSld>
+    <p:spTree>
+      <p:nvGrpSpPr>
+        <p:cNvPr id="1" name=""/>
+        <p:cNvGrpSpPr/>
+        <p:nvPr/>
+      </p:nvGrpSpPr>
+      <p:grpSpPr>
+        <a:xfrm>
+          <a:off x="0" y="0"/>
+          <a:ext cx="0" cy="0"/>
+          <a:chOff x="0" y="0"/>
+          <a:chExt cx="0" cy="0"/>
+        </a:xfrm>
+      </p:grpSpPr>
+      <p:sp>
+        <p:nvSpPr>
+          <p:cNvPr id="3" name="Content Placeholder 2"/>
+          <p:cNvSpPr>
+            <a:spLocks noGrp="1"/>
+          </p:cNvSpPr>
+          <p:nvPr>
+            <p:ph idx="1"/>
+          </p:nvPr>
+        </p:nvSpPr>
+        <p:spPr/>
+        <p:txBody>
+          <a:bodyPr/>
+          <a:lstStyle/>
+          <a:p>
+            <a:pPr lvl="0" marL="0" indent="0">
+              <a:buNone/>
+            </a:pPr>
+            <a:r>
+              <a:rPr/>
+              <a:t>And these render as:</a:t>
+            </a:r>
+          </a:p>
+          <a:p>
+            <a:pPr lvl="1">
+              <a:buAutoNum type="arabicPeriod"/>
+            </a:pPr>
+            <a:r>
+              <a:rPr/>
+              <a:t>a</a:t>
+            </a:r>
+          </a:p>
+          <a:p>
+            <a:pPr lvl="1">
+              <a:buAutoNum type="arabicPeriod"/>
+            </a:pPr>
+            <a:r>
+              <a:rPr/>
+              <a:t>numbered</a:t>
+            </a:r>
+          </a:p>
+          <a:p>
+            <a:pPr lvl="1">
+              <a:buAutoNum type="arabicPeriod"/>
+            </a:pPr>
+            <a:r>
+              <a:rPr/>
+              <a:t>list</a:t>
+            </a:r>
+          </a:p>
+        </p:txBody>
+      </p:sp>
+    </p:spTree>
+  </p:cSld>
+</p:sld>
+</file>
+
+<file path=ppt/slides/slide13.xml><?xml version="1.0" encoding="utf-8"?>
 <p:sld xmlns:a="http://schemas.openxmlformats.org/drawingml/2006/main" xmlns:r="http://schemas.openxmlformats.org/officeDocument/2006/relationships" xmlns:p="http://schemas.openxmlformats.org/presentationml/2006/main">
   <p:cSld>
     <p:spTree>
@@ -8492,15 +8556,15 @@
             </a:pPr>
             <a:r>
               <a:rPr/>
-              <a:t>Numbered</a:t>
-            </a:r>
-            <a:r>
-              <a:rPr/>
-              <a:t> </a:t>
-            </a:r>
-            <a:r>
-              <a:rPr/>
-              <a:t>Lists</a:t>
+              <a:t>Horizontal</a:t>
+            </a:r>
+            <a:r>
+              <a:rPr/>
+              <a:t> </a:t>
+            </a:r>
+            <a:r>
+              <a:rPr/>
+              <a:t>rules</a:t>
             </a:r>
           </a:p>
         </p:txBody>
@@ -8525,7 +8589,7 @@
             </a:pPr>
             <a:r>
               <a:rPr/>
-              <a:t>A numbered list like so:</a:t>
+              <a:t>You can use a horizontal rule to break up text:</a:t>
             </a:r>
           </a:p>
           <a:p>
@@ -8536,9 +8600,7 @@
               <a:rPr sz="1800">
                 <a:latin typeface="Courier"/>
               </a:rPr>
-              <a:t>1. a
-2. numbered
-3. list</a:t>
+              <a:t>---</a:t>
             </a:r>
           </a:p>
           <a:p>
@@ -8547,94 +8609,7 @@
             </a:pPr>
             <a:r>
               <a:rPr/>
-              <a:t>or like so:</a:t>
-            </a:r>
-          </a:p>
-          <a:p>
-            <a:pPr lvl="0" marL="1270000" indent="0">
-              <a:buNone/>
-            </a:pPr>
-            <a:r>
-              <a:rPr sz="1800">
-                <a:latin typeface="Courier"/>
-              </a:rPr>
-              <a:t>1) a
-2) numbered
-3) list</a:t>
-            </a:r>
-          </a:p>
-        </p:txBody>
-      </p:sp>
-    </p:spTree>
-  </p:cSld>
-</p:sld>
-</file>
-
-<file path=ppt/slides/slide13.xml><?xml version="1.0" encoding="utf-8"?>
-<p:sld xmlns:a="http://schemas.openxmlformats.org/drawingml/2006/main" xmlns:r="http://schemas.openxmlformats.org/officeDocument/2006/relationships" xmlns:p="http://schemas.openxmlformats.org/presentationml/2006/main">
-  <p:cSld>
-    <p:spTree>
-      <p:nvGrpSpPr>
-        <p:cNvPr id="1" name=""/>
-        <p:cNvGrpSpPr/>
-        <p:nvPr/>
-      </p:nvGrpSpPr>
-      <p:grpSpPr>
-        <a:xfrm>
-          <a:off x="0" y="0"/>
-          <a:ext cx="0" cy="0"/>
-          <a:chOff x="0" y="0"/>
-          <a:chExt cx="0" cy="0"/>
-        </a:xfrm>
-      </p:grpSpPr>
-      <p:sp>
-        <p:nvSpPr>
-          <p:cNvPr id="3" name="Content Placeholder 2"/>
-          <p:cNvSpPr>
-            <a:spLocks noGrp="1"/>
-          </p:cNvSpPr>
-          <p:nvPr>
-            <p:ph idx="1"/>
-          </p:nvPr>
-        </p:nvSpPr>
-        <p:spPr/>
-        <p:txBody>
-          <a:bodyPr/>
-          <a:lstStyle/>
-          <a:p>
-            <a:pPr lvl="0" marL="0" indent="0">
-              <a:buNone/>
-            </a:pPr>
-            <a:r>
-              <a:rPr/>
-              <a:t>And these render as:</a:t>
-            </a:r>
-          </a:p>
-          <a:p>
-            <a:pPr lvl="1">
-              <a:buAutoNum type="arabicPeriod"/>
-            </a:pPr>
-            <a:r>
-              <a:rPr/>
-              <a:t>a</a:t>
-            </a:r>
-          </a:p>
-          <a:p>
-            <a:pPr lvl="1">
-              <a:buAutoNum type="arabicPeriod"/>
-            </a:pPr>
-            <a:r>
-              <a:rPr/>
-              <a:t>numbered</a:t>
-            </a:r>
-          </a:p>
-          <a:p>
-            <a:pPr lvl="1">
-              <a:buAutoNum type="arabicPeriod"/>
-            </a:pPr>
-            <a:r>
-              <a:rPr/>
-              <a:t>list</a:t>
+              <a:t>which looks like this:</a:t>
             </a:r>
           </a:p>
         </p:txBody>
@@ -8686,15 +8661,15 @@
             </a:pPr>
             <a:r>
               <a:rPr/>
-              <a:t>Horizontal</a:t>
-            </a:r>
-            <a:r>
-              <a:rPr/>
-              <a:t> </a:t>
-            </a:r>
-            <a:r>
-              <a:rPr/>
-              <a:t>rules</a:t>
+              <a:t>Code</a:t>
+            </a:r>
+            <a:r>
+              <a:rPr/>
+              <a:t> </a:t>
+            </a:r>
+            <a:r>
+              <a:rPr/>
+              <a:t>blocks</a:t>
             </a:r>
           </a:p>
         </p:txBody>
@@ -8719,7 +8694,7 @@
             </a:pPr>
             <a:r>
               <a:rPr/>
-              <a:t>You can use a horizontal rule to break up text:</a:t>
+              <a:t>It can be useful to format code or data using code blocks. These are formatted using “back ticks” which look like so:</a:t>
             </a:r>
           </a:p>
           <a:p>
@@ -8730,7 +8705,7 @@
               <a:rPr sz="1800">
                 <a:latin typeface="Courier"/>
               </a:rPr>
-              <a:t>---</a:t>
+              <a:t>`a piece of code`</a:t>
             </a:r>
           </a:p>
           <a:p>
@@ -8739,7 +8714,7 @@
             </a:pPr>
             <a:r>
               <a:rPr/>
-              <a:t>which looks like this:</a:t>
+              <a:t>Use triple back ticks around a block of code.</a:t>
             </a:r>
           </a:p>
         </p:txBody>
@@ -8750,111 +8725,6 @@
 </file>
 
 <file path=ppt/slides/slide15.xml><?xml version="1.0" encoding="utf-8"?>
-<p:sld xmlns:a="http://schemas.openxmlformats.org/drawingml/2006/main" xmlns:r="http://schemas.openxmlformats.org/officeDocument/2006/relationships" xmlns:p="http://schemas.openxmlformats.org/presentationml/2006/main">
-  <p:cSld>
-    <p:spTree>
-      <p:nvGrpSpPr>
-        <p:cNvPr id="1" name=""/>
-        <p:cNvGrpSpPr/>
-        <p:nvPr/>
-      </p:nvGrpSpPr>
-      <p:grpSpPr>
-        <a:xfrm>
-          <a:off x="0" y="0"/>
-          <a:ext cx="0" cy="0"/>
-          <a:chOff x="0" y="0"/>
-          <a:chExt cx="0" cy="0"/>
-        </a:xfrm>
-      </p:grpSpPr>
-      <p:sp>
-        <p:nvSpPr>
-          <p:cNvPr id="11" name="Title 1"/>
-          <p:cNvSpPr>
-            <a:spLocks noGrp="1"/>
-          </p:cNvSpPr>
-          <p:nvPr>
-            <p:ph type="title"/>
-          </p:nvPr>
-        </p:nvSpPr>
-        <p:spPr>
-          <a:xfrm>
-            <a:off x="1935480" y="342841"/>
-            <a:ext cx="9418320" cy="1116286"/>
-          </a:xfrm>
-        </p:spPr>
-        <p:txBody>
-          <a:bodyPr/>
-          <a:lstStyle/>
-          <a:p>
-            <a:pPr lvl="0" marL="0" indent="0">
-              <a:buNone/>
-            </a:pPr>
-            <a:r>
-              <a:rPr/>
-              <a:t>Code</a:t>
-            </a:r>
-            <a:r>
-              <a:rPr/>
-              <a:t> </a:t>
-            </a:r>
-            <a:r>
-              <a:rPr/>
-              <a:t>blocks</a:t>
-            </a:r>
-          </a:p>
-        </p:txBody>
-      </p:sp>
-      <p:sp>
-        <p:nvSpPr>
-          <p:cNvPr id="3" name="Content Placeholder 2"/>
-          <p:cNvSpPr>
-            <a:spLocks noGrp="1"/>
-          </p:cNvSpPr>
-          <p:nvPr>
-            <p:ph idx="1"/>
-          </p:nvPr>
-        </p:nvSpPr>
-        <p:spPr/>
-        <p:txBody>
-          <a:bodyPr/>
-          <a:lstStyle/>
-          <a:p>
-            <a:pPr lvl="0" marL="0" indent="0">
-              <a:buNone/>
-            </a:pPr>
-            <a:r>
-              <a:rPr/>
-              <a:t>It can be useful to format code or data using code blocks. These are formatted using “back ticks” which look like so:</a:t>
-            </a:r>
-          </a:p>
-          <a:p>
-            <a:pPr lvl="0" marL="1270000" indent="0">
-              <a:buNone/>
-            </a:pPr>
-            <a:r>
-              <a:rPr sz="1800">
-                <a:latin typeface="Courier"/>
-              </a:rPr>
-              <a:t>`a piece of code`</a:t>
-            </a:r>
-          </a:p>
-          <a:p>
-            <a:pPr lvl="0" marL="0" indent="0">
-              <a:buNone/>
-            </a:pPr>
-            <a:r>
-              <a:rPr/>
-              <a:t>Use triple back ticks around a block of code.</a:t>
-            </a:r>
-          </a:p>
-        </p:txBody>
-      </p:sp>
-    </p:spTree>
-  </p:cSld>
-</p:sld>
-</file>
-
-<file path=ppt/slides/slide16.xml><?xml version="1.0" encoding="utf-8"?>
 <p:sld xmlns:a="http://schemas.openxmlformats.org/drawingml/2006/main" xmlns:r="http://schemas.openxmlformats.org/officeDocument/2006/relationships" xmlns:p="http://schemas.openxmlformats.org/presentationml/2006/main">
   <p:cSld>
     <p:spTree>
@@ -8962,7 +8832,7 @@
 </p:sld>
 </file>
 
-<file path=ppt/slides/slide17.xml><?xml version="1.0" encoding="utf-8"?>
+<file path=ppt/slides/slide16.xml><?xml version="1.0" encoding="utf-8"?>
 <p:sld xmlns:a="http://schemas.openxmlformats.org/drawingml/2006/main" xmlns:r="http://schemas.openxmlformats.org/officeDocument/2006/relationships" xmlns:p="http://schemas.openxmlformats.org/presentationml/2006/main">
   <p:cSld>
     <p:spTree>
@@ -9009,7 +8879,7 @@
 </p:sld>
 </file>
 
-<file path=ppt/slides/slide18.xml><?xml version="1.0" encoding="utf-8"?>
+<file path=ppt/slides/slide17.xml><?xml version="1.0" encoding="utf-8"?>
 <p:sld xmlns:a="http://schemas.openxmlformats.org/drawingml/2006/main" xmlns:r="http://schemas.openxmlformats.org/officeDocument/2006/relationships" xmlns:p="http://schemas.openxmlformats.org/presentationml/2006/main">
   <p:cSld>
     <p:spTree>
@@ -9061,7 +8931,7 @@
 </p:sld>
 </file>
 
-<file path=ppt/slides/slide19.xml><?xml version="1.0" encoding="utf-8"?>
+<file path=ppt/slides/slide18.xml><?xml version="1.0" encoding="utf-8"?>
 <p:sld xmlns:a="http://schemas.openxmlformats.org/drawingml/2006/main" xmlns:r="http://schemas.openxmlformats.org/officeDocument/2006/relationships" xmlns:p="http://schemas.openxmlformats.org/presentationml/2006/main">
   <p:cSld>
     <p:spTree>
@@ -9138,53 +9008,6 @@
 </file>
 
 <file path=ppt/slides/slide2.xml><?xml version="1.0" encoding="utf-8"?>
-<p:sld xmlns:a="http://schemas.openxmlformats.org/drawingml/2006/main" xmlns:r="http://schemas.openxmlformats.org/officeDocument/2006/relationships" xmlns:p="http://schemas.openxmlformats.org/presentationml/2006/main">
-  <p:cSld>
-    <p:spTree>
-      <p:nvGrpSpPr>
-        <p:cNvPr id="1" name=""/>
-        <p:cNvGrpSpPr/>
-        <p:nvPr/>
-      </p:nvGrpSpPr>
-      <p:grpSpPr>
-        <a:xfrm>
-          <a:off x="0" y="0"/>
-          <a:ext cx="0" cy="0"/>
-          <a:chOff x="0" y="0"/>
-          <a:chExt cx="0" cy="0"/>
-        </a:xfrm>
-      </p:grpSpPr>
-      <p:sp>
-        <p:nvSpPr>
-          <p:cNvPr id="3" name="Content Placeholder 2"/>
-          <p:cNvSpPr>
-            <a:spLocks noGrp="1"/>
-          </p:cNvSpPr>
-          <p:nvPr>
-            <p:ph idx="1"/>
-          </p:nvPr>
-        </p:nvSpPr>
-        <p:spPr/>
-        <p:txBody>
-          <a:bodyPr/>
-          <a:lstStyle/>
-          <a:p>
-            <a:pPr lvl="0" marL="0" indent="0">
-              <a:buNone/>
-            </a:pPr>
-            <a:r>
-              <a:rPr/>
-              <a:t>Download Slides</a:t>
-            </a:r>
-          </a:p>
-        </p:txBody>
-      </p:sp>
-    </p:spTree>
-  </p:cSld>
-</p:sld>
-</file>
-
-<file path=ppt/slides/slide3.xml><?xml version="1.0" encoding="utf-8"?>
 <p:sld xmlns:a="http://schemas.openxmlformats.org/drawingml/2006/main" xmlns:r="http://schemas.openxmlformats.org/officeDocument/2006/relationships" xmlns:p="http://schemas.openxmlformats.org/presentationml/2006/main">
   <p:cSld>
     <p:spTree>
@@ -9244,7 +9067,7 @@
 </p:sld>
 </file>
 
-<file path=ppt/slides/slide4.xml><?xml version="1.0" encoding="utf-8"?>
+<file path=ppt/slides/slide3.xml><?xml version="1.0" encoding="utf-8"?>
 <p:sld xmlns:a="http://schemas.openxmlformats.org/drawingml/2006/main" xmlns:r="http://schemas.openxmlformats.org/officeDocument/2006/relationships" xmlns:p="http://schemas.openxmlformats.org/presentationml/2006/main">
   <p:cSld>
     <p:spTree>
@@ -9294,6 +9117,66 @@
             <a:r>
               <a:rPr/>
               <a:t>Edit a Markdown document using the Github website and view your text rendered as a web page</a:t>
+            </a:r>
+          </a:p>
+        </p:txBody>
+      </p:sp>
+    </p:spTree>
+  </p:cSld>
+</p:sld>
+</file>
+
+<file path=ppt/slides/slide4.xml><?xml version="1.0" encoding="utf-8"?>
+<p:sld xmlns:a="http://schemas.openxmlformats.org/drawingml/2006/main" xmlns:r="http://schemas.openxmlformats.org/officeDocument/2006/relationships" xmlns:p="http://schemas.openxmlformats.org/presentationml/2006/main">
+  <p:cSld>
+    <p:spTree>
+      <p:nvGrpSpPr>
+        <p:cNvPr id="1" name=""/>
+        <p:cNvGrpSpPr/>
+        <p:nvPr/>
+      </p:nvGrpSpPr>
+      <p:grpSpPr>
+        <a:xfrm>
+          <a:off x="0" y="0"/>
+          <a:ext cx="0" cy="0"/>
+          <a:chOff x="0" y="0"/>
+          <a:chExt cx="0" cy="0"/>
+        </a:xfrm>
+      </p:grpSpPr>
+      <p:sp>
+        <p:nvSpPr>
+          <p:cNvPr id="9" name="Title 1"/>
+          <p:cNvSpPr>
+            <a:spLocks noGrp="1"/>
+          </p:cNvSpPr>
+          <p:nvPr>
+            <p:ph type="title"/>
+          </p:nvPr>
+        </p:nvSpPr>
+        <p:spPr>
+          <a:xfrm>
+            <a:off x="1935480" y="382053"/>
+            <a:ext cx="9418320" cy="669507"/>
+          </a:xfrm>
+        </p:spPr>
+        <p:txBody>
+          <a:bodyPr/>
+          <a:lstStyle/>
+          <a:p>
+            <a:pPr lvl="0" marL="0" indent="0">
+              <a:buNone/>
+            </a:pPr>
+            <a:r>
+              <a:rPr/>
+              <a:t>Lecture</a:t>
+            </a:r>
+            <a:r>
+              <a:rPr/>
+              <a:t> </a:t>
+            </a:r>
+            <a:r>
+              <a:rPr/>
+              <a:t>Content</a:t>
             </a:r>
           </a:p>
         </p:txBody>
@@ -9345,15 +9228,15 @@
             </a:pPr>
             <a:r>
               <a:rPr/>
-              <a:t>Lecture</a:t>
-            </a:r>
-            <a:r>
-              <a:rPr/>
-              <a:t> </a:t>
-            </a:r>
-            <a:r>
-              <a:rPr/>
-              <a:t>Content</a:t>
+              <a:t>Markdown</a:t>
+            </a:r>
+            <a:r>
+              <a:rPr/>
+              <a:t> </a:t>
+            </a:r>
+            <a:r>
+              <a:rPr/>
+              <a:t>Syntax</a:t>
             </a:r>
           </a:p>
         </p:txBody>
@@ -9382,7 +9265,7 @@
       </p:grpSpPr>
       <p:sp>
         <p:nvSpPr>
-          <p:cNvPr id="9" name="Title 1"/>
+          <p:cNvPr id="11" name="Title 1"/>
           <p:cNvSpPr>
             <a:spLocks noGrp="1"/>
           </p:cNvSpPr>
@@ -9392,8 +9275,8 @@
         </p:nvSpPr>
         <p:spPr>
           <a:xfrm>
-            <a:off x="1935480" y="382053"/>
-            <a:ext cx="9418320" cy="669507"/>
+            <a:off x="1935480" y="342841"/>
+            <a:ext cx="9418320" cy="1116286"/>
           </a:xfrm>
         </p:spPr>
         <p:txBody>
@@ -9405,15 +9288,105 @@
             </a:pPr>
             <a:r>
               <a:rPr/>
-              <a:t>Markdown</a:t>
-            </a:r>
-            <a:r>
-              <a:rPr/>
-              <a:t> </a:t>
-            </a:r>
-            <a:r>
-              <a:rPr/>
-              <a:t>Syntax</a:t>
+              <a:t>Bold</a:t>
+            </a:r>
+            <a:r>
+              <a:rPr/>
+              <a:t> </a:t>
+            </a:r>
+            <a:r>
+              <a:rPr/>
+              <a:t>and</a:t>
+            </a:r>
+            <a:r>
+              <a:rPr/>
+              <a:t> </a:t>
+            </a:r>
+            <a:r>
+              <a:rPr/>
+              <a:t>italics</a:t>
+            </a:r>
+          </a:p>
+        </p:txBody>
+      </p:sp>
+      <p:sp>
+        <p:nvSpPr>
+          <p:cNvPr id="3" name="Content Placeholder 2"/>
+          <p:cNvSpPr>
+            <a:spLocks noGrp="1"/>
+          </p:cNvSpPr>
+          <p:nvPr>
+            <p:ph idx="1"/>
+          </p:nvPr>
+        </p:nvSpPr>
+        <p:spPr/>
+        <p:txBody>
+          <a:bodyPr/>
+          <a:lstStyle/>
+          <a:p>
+            <a:pPr lvl="0" marL="0" indent="0">
+              <a:buNone/>
+            </a:pPr>
+            <a:r>
+              <a:rPr/>
+              <a:t>Type </a:t>
+            </a:r>
+            <a:r>
+              <a:rPr sz="1800">
+                <a:latin typeface="Courier"/>
+              </a:rPr>
+              <a:t>*Italic*</a:t>
+            </a:r>
+            <a:r>
+              <a:rPr/>
+              <a:t> or </a:t>
+            </a:r>
+            <a:r>
+              <a:rPr sz="1800">
+                <a:latin typeface="Courier"/>
+              </a:rPr>
+              <a:t>_Italic_</a:t>
+            </a:r>
+            <a:r>
+              <a:rPr/>
+              <a:t> to get </a:t>
+            </a:r>
+            <a:r>
+              <a:rPr i="1"/>
+              <a:t>Italic</a:t>
+            </a:r>
+          </a:p>
+          <a:p>
+            <a:pPr lvl="0" marL="0" indent="0">
+              <a:buNone/>
+            </a:pPr>
+            <a:r>
+              <a:rPr/>
+              <a:t>Type </a:t>
+            </a:r>
+            <a:r>
+              <a:rPr sz="1800">
+                <a:latin typeface="Courier"/>
+              </a:rPr>
+              <a:t>**Bold**</a:t>
+            </a:r>
+            <a:r>
+              <a:rPr/>
+              <a:t> or </a:t>
+            </a:r>
+            <a:r>
+              <a:rPr sz="1800">
+                <a:latin typeface="Courier"/>
+              </a:rPr>
+              <a:t>__Bold__</a:t>
+            </a:r>
+            <a:r>
+              <a:rPr/>
+              <a:t> to get </a:t>
+            </a:r>
+            <a:r>
+              <a:rPr b="1"/>
+              <a:t>Bold</a:t>
             </a:r>
           </a:p>
         </p:txBody>
@@ -9465,23 +9438,7 @@
             </a:pPr>
             <a:r>
               <a:rPr/>
-              <a:t>Bold</a:t>
-            </a:r>
-            <a:r>
-              <a:rPr/>
-              <a:t> </a:t>
-            </a:r>
-            <a:r>
-              <a:rPr/>
-              <a:t>and</a:t>
-            </a:r>
-            <a:r>
-              <a:rPr/>
-              <a:t> </a:t>
-            </a:r>
-            <a:r>
-              <a:rPr/>
-              <a:t>italics</a:t>
+              <a:t>Blockquotes</a:t>
             </a:r>
           </a:p>
         </p:txBody>
@@ -9512,58 +9469,20 @@
               <a:rPr sz="1800">
                 <a:latin typeface="Courier"/>
               </a:rPr>
-              <a:t>*Italic*</a:t>
-            </a:r>
-            <a:r>
-              <a:rPr/>
-              <a:t> or </a:t>
-            </a:r>
-            <a:r>
-              <a:rPr sz="1800">
-                <a:latin typeface="Courier"/>
-              </a:rPr>
-              <a:t>_Italic_</a:t>
-            </a:r>
-            <a:r>
-              <a:rPr/>
-              <a:t> to get </a:t>
-            </a:r>
-            <a:r>
-              <a:rPr i="1"/>
-              <a:t>Italic</a:t>
-            </a:r>
-          </a:p>
-          <a:p>
-            <a:pPr lvl="0" marL="0" indent="0">
+              <a:t>&gt; Blockquote</a:t>
+            </a:r>
+            <a:r>
+              <a:rPr/>
+              <a:t> to get:</a:t>
+            </a:r>
+          </a:p>
+          <a:p>
+            <a:pPr lvl="0" marL="1270000" indent="0">
               <a:buNone/>
             </a:pPr>
             <a:r>
-              <a:rPr/>
-              <a:t>Type </a:t>
-            </a:r>
-            <a:r>
-              <a:rPr sz="1800">
-                <a:latin typeface="Courier"/>
-              </a:rPr>
-              <a:t>**Bold**</a:t>
-            </a:r>
-            <a:r>
-              <a:rPr/>
-              <a:t> or </a:t>
-            </a:r>
-            <a:r>
-              <a:rPr sz="1800">
-                <a:latin typeface="Courier"/>
-              </a:rPr>
-              <a:t>__Bold__</a:t>
-            </a:r>
-            <a:r>
-              <a:rPr/>
-              <a:t> to get </a:t>
-            </a:r>
-            <a:r>
-              <a:rPr b="1"/>
-              <a:t>Bold</a:t>
+              <a:rPr sz="2000"/>
+              <a:t>Blockquote</a:t>
             </a:r>
           </a:p>
         </p:txBody>
@@ -9615,7 +9534,7 @@
             </a:pPr>
             <a:r>
               <a:rPr/>
-              <a:t>Blockquotes</a:t>
+              <a:t>Headings</a:t>
             </a:r>
           </a:p>
         </p:txBody>
@@ -9640,26 +9559,37 @@
             </a:pPr>
             <a:r>
               <a:rPr/>
-              <a:t>Type </a:t>
+              <a:t>Use </a:t>
             </a:r>
             <a:r>
               <a:rPr sz="1800">
                 <a:latin typeface="Courier"/>
               </a:rPr>
-              <a:t>&gt; Blockquote</a:t>
-            </a:r>
-            <a:r>
-              <a:rPr/>
-              <a:t> to get:</a:t>
-            </a:r>
-          </a:p>
-          <a:p>
-            <a:pPr lvl="0" marL="1270000" indent="0">
-              <a:buNone/>
-            </a:pPr>
-            <a:r>
-              <a:rPr sz="2000"/>
-              <a:t>Blockquote</a:t>
+              <a:t># Heading 1</a:t>
+            </a:r>
+            <a:r>
+              <a:rPr/>
+              <a:t> to </a:t>
+            </a:r>
+            <a:r>
+              <a:rPr sz="1800">
+                <a:latin typeface="Courier"/>
+              </a:rPr>
+              <a:t>## Heading 2</a:t>
+            </a:r>
+            <a:r>
+              <a:rPr/>
+              <a:t>, </a:t>
+            </a:r>
+            <a:r>
+              <a:rPr sz="1800">
+                <a:latin typeface="Courier"/>
+              </a:rPr>
+              <a:t>### Heading 3</a:t>
+            </a:r>
+            <a:r>
+              <a:rPr/>
+              <a:t> etc.</a:t>
             </a:r>
           </a:p>
         </p:txBody>
@@ -9711,7 +9641,7 @@
             </a:pPr>
             <a:r>
               <a:rPr/>
-              <a:t>Headings</a:t>
+              <a:t>Links</a:t>
             </a:r>
           </a:p>
         </p:txBody>
@@ -9736,37 +9666,59 @@
             </a:pPr>
             <a:r>
               <a:rPr/>
-              <a:t>Use </a:t>
-            </a:r>
+              <a:t>There are two ways to format links:</a:t>
+            </a:r>
+          </a:p>
+          <a:p>
+            <a:pPr lvl="0" marL="1270000" indent="0">
+              <a:buNone/>
+            </a:pPr>
             <a:r>
               <a:rPr sz="1800">
                 <a:latin typeface="Courier"/>
               </a:rPr>
-              <a:t># Heading 1</a:t>
-            </a:r>
-            <a:r>
-              <a:rPr/>
-              <a:t> to </a:t>
-            </a:r>
+              <a:t>[An inline link](http://a.com)</a:t>
+            </a:r>
+          </a:p>
+          <a:p>
+            <a:pPr lvl="0" marL="0" indent="0">
+              <a:buNone/>
+            </a:pPr>
+            <a:r>
+              <a:rPr/>
+              <a:t>or</a:t>
+            </a:r>
+          </a:p>
+          <a:p>
+            <a:pPr lvl="0" marL="1270000" indent="0">
+              <a:buNone/>
+            </a:pPr>
             <a:r>
               <a:rPr sz="1800">
                 <a:latin typeface="Courier"/>
               </a:rPr>
-              <a:t>## Heading 2</a:t>
-            </a:r>
-            <a:r>
-              <a:rPr/>
-              <a:t>, </a:t>
-            </a:r>
-            <a:r>
-              <a:rPr sz="1800">
-                <a:latin typeface="Courier"/>
+              <a:t>[Link][1]
+This is a good way to record references in a lesson
+[1]: http://b.org</a:t>
+            </a:r>
+          </a:p>
+          <a:p>
+            <a:pPr lvl="0" marL="0" indent="0">
+              <a:buNone/>
+            </a:pPr>
+            <a:r>
+              <a:rPr/>
+              <a:t>Both appear </a:t>
+            </a:r>
+            <a:r>
+              <a:rPr>
+                <a:hlinkClick r:id="rId2"/>
               </a:rPr>
-              <a:t>### Heading 3</a:t>
-            </a:r>
-            <a:r>
-              <a:rPr/>
-              <a:t> etc.</a:t>
+              <a:t>like this</a:t>
+            </a:r>
+            <a:r>
+              <a:rPr/>
+              <a:t>.</a:t>
             </a:r>
           </a:p>
         </p:txBody>

</xml_diff>